<commit_message>
Update Multi Transwell TEER sample Plate.pptx
</commit_message>
<xml_diff>
--- a/models/Multi Transwell TEER sample Plate.pptx
+++ b/models/Multi Transwell TEER sample Plate.pptx
@@ -108,6 +108,11 @@
       </a:defRPr>
     </a:lvl9pPr>
   </p:defaultTextStyle>
+  <p:extLst>
+    <p:ext uri="{EFAFB233-063F-42B5-8137-9DF3F51BA10A}">
+      <p15:sldGuideLst xmlns:p15="http://schemas.microsoft.com/office/powerpoint/2012/main"/>
+    </p:ext>
+  </p:extLst>
 </p:presentation>
 </file>
 
@@ -5231,6 +5236,252 @@
           </a:p>
         </p:txBody>
       </p:sp>
+      <p:sp>
+        <p:nvSpPr>
+          <p:cNvPr id="3" name="TextBox 2">
+            <a:extLst>
+              <a:ext uri="{FF2B5EF4-FFF2-40B4-BE49-F238E27FC236}">
+                <a16:creationId xmlns:a16="http://schemas.microsoft.com/office/drawing/2014/main" id="{AEA0C681-71F4-3367-9566-0F96C62B483A}"/>
+              </a:ext>
+            </a:extLst>
+          </p:cNvPr>
+          <p:cNvSpPr txBox="1"/>
+          <p:nvPr/>
+        </p:nvSpPr>
+        <p:spPr>
+          <a:xfrm>
+            <a:off x="1859863" y="3148346"/>
+            <a:ext cx="914417" cy="369332"/>
+          </a:xfrm>
+          <a:prstGeom prst="rect">
+            <a:avLst/>
+          </a:prstGeom>
+          <a:noFill/>
+        </p:spPr>
+        <p:txBody>
+          <a:bodyPr wrap="none" rtlCol="0">
+            <a:spAutoFit/>
+          </a:bodyPr>
+          <a:lstStyle/>
+          <a:p>
+            <a:r>
+              <a:rPr lang="en-US" dirty="0"/>
+              <a:t>Magnet</a:t>
+            </a:r>
+          </a:p>
+        </p:txBody>
+      </p:sp>
+      <p:sp>
+        <p:nvSpPr>
+          <p:cNvPr id="34" name="TextBox 33">
+            <a:extLst>
+              <a:ext uri="{FF2B5EF4-FFF2-40B4-BE49-F238E27FC236}">
+                <a16:creationId xmlns:a16="http://schemas.microsoft.com/office/drawing/2014/main" id="{938FC46A-190A-B38D-9337-2E1C49C0C939}"/>
+              </a:ext>
+            </a:extLst>
+          </p:cNvPr>
+          <p:cNvSpPr txBox="1"/>
+          <p:nvPr/>
+        </p:nvSpPr>
+        <p:spPr>
+          <a:xfrm>
+            <a:off x="3324225" y="3059389"/>
+            <a:ext cx="1165191" cy="369332"/>
+          </a:xfrm>
+          <a:prstGeom prst="rect">
+            <a:avLst/>
+          </a:prstGeom>
+          <a:noFill/>
+        </p:spPr>
+        <p:txBody>
+          <a:bodyPr wrap="none" rtlCol="0">
+            <a:spAutoFit/>
+          </a:bodyPr>
+          <a:lstStyle/>
+          <a:p>
+            <a:r>
+              <a:rPr lang="en-US" dirty="0"/>
+              <a:t>Electrodes</a:t>
+            </a:r>
+          </a:p>
+        </p:txBody>
+      </p:sp>
+      <p:sp>
+        <p:nvSpPr>
+          <p:cNvPr id="35" name="TextBox 34">
+            <a:extLst>
+              <a:ext uri="{FF2B5EF4-FFF2-40B4-BE49-F238E27FC236}">
+                <a16:creationId xmlns:a16="http://schemas.microsoft.com/office/drawing/2014/main" id="{98D16657-AF93-C375-51B5-6A02A1FD7B8B}"/>
+              </a:ext>
+            </a:extLst>
+          </p:cNvPr>
+          <p:cNvSpPr txBox="1"/>
+          <p:nvPr/>
+        </p:nvSpPr>
+        <p:spPr>
+          <a:xfrm>
+            <a:off x="4407214" y="5681212"/>
+            <a:ext cx="1165191" cy="369332"/>
+          </a:xfrm>
+          <a:prstGeom prst="rect">
+            <a:avLst/>
+          </a:prstGeom>
+          <a:noFill/>
+        </p:spPr>
+        <p:txBody>
+          <a:bodyPr wrap="none" rtlCol="0">
+            <a:spAutoFit/>
+          </a:bodyPr>
+          <a:lstStyle/>
+          <a:p>
+            <a:r>
+              <a:rPr lang="en-US" dirty="0"/>
+              <a:t>Electrodes</a:t>
+            </a:r>
+          </a:p>
+        </p:txBody>
+      </p:sp>
+      <p:sp>
+        <p:nvSpPr>
+          <p:cNvPr id="36" name="TextBox 35">
+            <a:extLst>
+              <a:ext uri="{FF2B5EF4-FFF2-40B4-BE49-F238E27FC236}">
+                <a16:creationId xmlns:a16="http://schemas.microsoft.com/office/drawing/2014/main" id="{D221FA79-B6B4-B083-67C7-B872D8D1EA30}"/>
+              </a:ext>
+            </a:extLst>
+          </p:cNvPr>
+          <p:cNvSpPr txBox="1"/>
+          <p:nvPr/>
+        </p:nvSpPr>
+        <p:spPr>
+          <a:xfrm>
+            <a:off x="329346" y="3676649"/>
+            <a:ext cx="457176" cy="369332"/>
+          </a:xfrm>
+          <a:prstGeom prst="rect">
+            <a:avLst/>
+          </a:prstGeom>
+          <a:noFill/>
+        </p:spPr>
+        <p:txBody>
+          <a:bodyPr wrap="none" rtlCol="0">
+            <a:spAutoFit/>
+          </a:bodyPr>
+          <a:lstStyle/>
+          <a:p>
+            <a:r>
+              <a:rPr lang="en-US" dirty="0"/>
+              <a:t>Lid</a:t>
+            </a:r>
+          </a:p>
+        </p:txBody>
+      </p:sp>
+      <p:sp>
+        <p:nvSpPr>
+          <p:cNvPr id="37" name="TextBox 36">
+            <a:extLst>
+              <a:ext uri="{FF2B5EF4-FFF2-40B4-BE49-F238E27FC236}">
+                <a16:creationId xmlns:a16="http://schemas.microsoft.com/office/drawing/2014/main" id="{01F7348D-8E7D-345D-060B-C434EC9799DF}"/>
+              </a:ext>
+            </a:extLst>
+          </p:cNvPr>
+          <p:cNvSpPr txBox="1"/>
+          <p:nvPr/>
+        </p:nvSpPr>
+        <p:spPr>
+          <a:xfrm>
+            <a:off x="330864" y="5310971"/>
+            <a:ext cx="684803" cy="369332"/>
+          </a:xfrm>
+          <a:prstGeom prst="rect">
+            <a:avLst/>
+          </a:prstGeom>
+          <a:noFill/>
+        </p:spPr>
+        <p:txBody>
+          <a:bodyPr wrap="none" rtlCol="0">
+            <a:spAutoFit/>
+          </a:bodyPr>
+          <a:lstStyle/>
+          <a:p>
+            <a:r>
+              <a:rPr lang="en-US" dirty="0"/>
+              <a:t>Basin</a:t>
+            </a:r>
+          </a:p>
+        </p:txBody>
+      </p:sp>
+      <p:sp>
+        <p:nvSpPr>
+          <p:cNvPr id="38" name="TextBox 37">
+            <a:extLst>
+              <a:ext uri="{FF2B5EF4-FFF2-40B4-BE49-F238E27FC236}">
+                <a16:creationId xmlns:a16="http://schemas.microsoft.com/office/drawing/2014/main" id="{CA796F5A-AB2A-F0AA-3465-D9ECD5562A8C}"/>
+              </a:ext>
+            </a:extLst>
+          </p:cNvPr>
+          <p:cNvSpPr txBox="1"/>
+          <p:nvPr/>
+        </p:nvSpPr>
+        <p:spPr>
+          <a:xfrm>
+            <a:off x="5380179" y="4540315"/>
+            <a:ext cx="1063304" cy="369332"/>
+          </a:xfrm>
+          <a:prstGeom prst="rect">
+            <a:avLst/>
+          </a:prstGeom>
+          <a:noFill/>
+        </p:spPr>
+        <p:txBody>
+          <a:bodyPr wrap="none" rtlCol="0">
+            <a:spAutoFit/>
+          </a:bodyPr>
+          <a:lstStyle/>
+          <a:p>
+            <a:r>
+              <a:rPr lang="en-US" dirty="0" err="1"/>
+              <a:t>Transwell</a:t>
+            </a:r>
+            <a:endParaRPr lang="en-US" dirty="0"/>
+          </a:p>
+        </p:txBody>
+      </p:sp>
+      <p:sp>
+        <p:nvSpPr>
+          <p:cNvPr id="39" name="TextBox 38">
+            <a:extLst>
+              <a:ext uri="{FF2B5EF4-FFF2-40B4-BE49-F238E27FC236}">
+                <a16:creationId xmlns:a16="http://schemas.microsoft.com/office/drawing/2014/main" id="{3D72DDAE-4007-F28C-3771-7FA6E2389338}"/>
+              </a:ext>
+            </a:extLst>
+          </p:cNvPr>
+          <p:cNvSpPr txBox="1"/>
+          <p:nvPr/>
+        </p:nvSpPr>
+        <p:spPr>
+          <a:xfrm>
+            <a:off x="1661043" y="5190836"/>
+            <a:ext cx="914417" cy="369332"/>
+          </a:xfrm>
+          <a:prstGeom prst="rect">
+            <a:avLst/>
+          </a:prstGeom>
+          <a:noFill/>
+        </p:spPr>
+        <p:txBody>
+          <a:bodyPr wrap="none" rtlCol="0">
+            <a:spAutoFit/>
+          </a:bodyPr>
+          <a:lstStyle/>
+          <a:p>
+            <a:r>
+              <a:rPr lang="en-US" dirty="0"/>
+              <a:t>Magnet</a:t>
+            </a:r>
+          </a:p>
+        </p:txBody>
+      </p:sp>
     </p:spTree>
     <p:extLst>
       <p:ext uri="{BB962C8B-B14F-4D97-AF65-F5344CB8AC3E}">
@@ -6539,6 +6790,146 @@
           <a:p>
             <a:pPr algn="ctr"/>
             <a:endParaRPr lang="en-US"/>
+          </a:p>
+        </p:txBody>
+      </p:sp>
+      <p:sp>
+        <p:nvSpPr>
+          <p:cNvPr id="4" name="TextBox 3">
+            <a:extLst>
+              <a:ext uri="{FF2B5EF4-FFF2-40B4-BE49-F238E27FC236}">
+                <a16:creationId xmlns:a16="http://schemas.microsoft.com/office/drawing/2014/main" id="{4A9E37B7-158C-8ADA-FAF8-BB1C1ADF5B50}"/>
+              </a:ext>
+            </a:extLst>
+          </p:cNvPr>
+          <p:cNvSpPr txBox="1"/>
+          <p:nvPr/>
+        </p:nvSpPr>
+        <p:spPr>
+          <a:xfrm>
+            <a:off x="4545584" y="3657560"/>
+            <a:ext cx="551754" cy="369332"/>
+          </a:xfrm>
+          <a:prstGeom prst="rect">
+            <a:avLst/>
+          </a:prstGeom>
+          <a:noFill/>
+        </p:spPr>
+        <p:txBody>
+          <a:bodyPr wrap="none" rtlCol="0">
+            <a:spAutoFit/>
+          </a:bodyPr>
+          <a:lstStyle/>
+          <a:p>
+            <a:r>
+              <a:rPr lang="en-US" dirty="0"/>
+              <a:t>PCB</a:t>
+            </a:r>
+          </a:p>
+        </p:txBody>
+      </p:sp>
+      <p:sp>
+        <p:nvSpPr>
+          <p:cNvPr id="6" name="TextBox 5">
+            <a:extLst>
+              <a:ext uri="{FF2B5EF4-FFF2-40B4-BE49-F238E27FC236}">
+                <a16:creationId xmlns:a16="http://schemas.microsoft.com/office/drawing/2014/main" id="{6A621241-4706-FBD8-5650-2453239BFC48}"/>
+              </a:ext>
+            </a:extLst>
+          </p:cNvPr>
+          <p:cNvSpPr txBox="1"/>
+          <p:nvPr/>
+        </p:nvSpPr>
+        <p:spPr>
+          <a:xfrm>
+            <a:off x="4697984" y="3809960"/>
+            <a:ext cx="551754" cy="369332"/>
+          </a:xfrm>
+          <a:prstGeom prst="rect">
+            <a:avLst/>
+          </a:prstGeom>
+          <a:noFill/>
+        </p:spPr>
+        <p:txBody>
+          <a:bodyPr wrap="none" rtlCol="0">
+            <a:spAutoFit/>
+          </a:bodyPr>
+          <a:lstStyle/>
+          <a:p>
+            <a:r>
+              <a:rPr lang="en-US" dirty="0"/>
+              <a:t>PCB</a:t>
+            </a:r>
+          </a:p>
+        </p:txBody>
+      </p:sp>
+      <p:sp>
+        <p:nvSpPr>
+          <p:cNvPr id="7" name="TextBox 6">
+            <a:extLst>
+              <a:ext uri="{FF2B5EF4-FFF2-40B4-BE49-F238E27FC236}">
+                <a16:creationId xmlns:a16="http://schemas.microsoft.com/office/drawing/2014/main" id="{27E7A281-1B26-ABC6-A897-D8F1B4BAACB7}"/>
+              </a:ext>
+            </a:extLst>
+          </p:cNvPr>
+          <p:cNvSpPr txBox="1"/>
+          <p:nvPr/>
+        </p:nvSpPr>
+        <p:spPr>
+          <a:xfrm>
+            <a:off x="9128582" y="3640781"/>
+            <a:ext cx="1205908" cy="369332"/>
+          </a:xfrm>
+          <a:prstGeom prst="rect">
+            <a:avLst/>
+          </a:prstGeom>
+          <a:noFill/>
+        </p:spPr>
+        <p:txBody>
+          <a:bodyPr wrap="none" rtlCol="0">
+            <a:spAutoFit/>
+          </a:bodyPr>
+          <a:lstStyle/>
+          <a:p>
+            <a:r>
+              <a:rPr lang="en-US" dirty="0"/>
+              <a:t>Receptacle</a:t>
+            </a:r>
+          </a:p>
+        </p:txBody>
+      </p:sp>
+      <p:sp>
+        <p:nvSpPr>
+          <p:cNvPr id="8" name="TextBox 7">
+            <a:extLst>
+              <a:ext uri="{FF2B5EF4-FFF2-40B4-BE49-F238E27FC236}">
+                <a16:creationId xmlns:a16="http://schemas.microsoft.com/office/drawing/2014/main" id="{3D425E1B-E893-D0C6-322A-A052771E9CEF}"/>
+              </a:ext>
+            </a:extLst>
+          </p:cNvPr>
+          <p:cNvSpPr txBox="1"/>
+          <p:nvPr/>
+        </p:nvSpPr>
+        <p:spPr>
+          <a:xfrm>
+            <a:off x="2541616" y="2755857"/>
+            <a:ext cx="725070" cy="369332"/>
+          </a:xfrm>
+          <a:prstGeom prst="rect">
+            <a:avLst/>
+          </a:prstGeom>
+          <a:noFill/>
+        </p:spPr>
+        <p:txBody>
+          <a:bodyPr wrap="none" rtlCol="0">
+            <a:spAutoFit/>
+          </a:bodyPr>
+          <a:lstStyle/>
+          <a:p>
+            <a:r>
+              <a:rPr lang="en-US" dirty="0"/>
+              <a:t>Wires</a:t>
+            </a:r>
           </a:p>
         </p:txBody>
       </p:sp>

</xml_diff>